<commit_message>
Start polishing Example 2
</commit_message>
<xml_diff>
--- a/plots/age.pptx
+++ b/plots/age.pptx
@@ -259,7 +259,7 @@
           <a:p>
             <a:fld id="{CD874F49-FEBB-FF42-B278-30C4F47372F7}" type="datetimeFigureOut">
               <a:rPr lang="de-DE" smtClean="0"/>
-              <a:t>08.07.25</a:t>
+              <a:t>15.07.25</a:t>
             </a:fld>
             <a:endParaRPr lang="de-DE"/>
           </a:p>
@@ -457,7 +457,7 @@
           <a:p>
             <a:fld id="{CD874F49-FEBB-FF42-B278-30C4F47372F7}" type="datetimeFigureOut">
               <a:rPr lang="de-DE" smtClean="0"/>
-              <a:t>08.07.25</a:t>
+              <a:t>15.07.25</a:t>
             </a:fld>
             <a:endParaRPr lang="de-DE"/>
           </a:p>
@@ -665,7 +665,7 @@
           <a:p>
             <a:fld id="{CD874F49-FEBB-FF42-B278-30C4F47372F7}" type="datetimeFigureOut">
               <a:rPr lang="de-DE" smtClean="0"/>
-              <a:t>08.07.25</a:t>
+              <a:t>15.07.25</a:t>
             </a:fld>
             <a:endParaRPr lang="de-DE"/>
           </a:p>
@@ -863,7 +863,7 @@
           <a:p>
             <a:fld id="{CD874F49-FEBB-FF42-B278-30C4F47372F7}" type="datetimeFigureOut">
               <a:rPr lang="de-DE" smtClean="0"/>
-              <a:t>08.07.25</a:t>
+              <a:t>15.07.25</a:t>
             </a:fld>
             <a:endParaRPr lang="de-DE"/>
           </a:p>
@@ -1138,7 +1138,7 @@
           <a:p>
             <a:fld id="{CD874F49-FEBB-FF42-B278-30C4F47372F7}" type="datetimeFigureOut">
               <a:rPr lang="de-DE" smtClean="0"/>
-              <a:t>08.07.25</a:t>
+              <a:t>15.07.25</a:t>
             </a:fld>
             <a:endParaRPr lang="de-DE"/>
           </a:p>
@@ -1403,7 +1403,7 @@
           <a:p>
             <a:fld id="{CD874F49-FEBB-FF42-B278-30C4F47372F7}" type="datetimeFigureOut">
               <a:rPr lang="de-DE" smtClean="0"/>
-              <a:t>08.07.25</a:t>
+              <a:t>15.07.25</a:t>
             </a:fld>
             <a:endParaRPr lang="de-DE"/>
           </a:p>
@@ -1815,7 +1815,7 @@
           <a:p>
             <a:fld id="{CD874F49-FEBB-FF42-B278-30C4F47372F7}" type="datetimeFigureOut">
               <a:rPr lang="de-DE" smtClean="0"/>
-              <a:t>08.07.25</a:t>
+              <a:t>15.07.25</a:t>
             </a:fld>
             <a:endParaRPr lang="de-DE"/>
           </a:p>
@@ -1956,7 +1956,7 @@
           <a:p>
             <a:fld id="{CD874F49-FEBB-FF42-B278-30C4F47372F7}" type="datetimeFigureOut">
               <a:rPr lang="de-DE" smtClean="0"/>
-              <a:t>08.07.25</a:t>
+              <a:t>15.07.25</a:t>
             </a:fld>
             <a:endParaRPr lang="de-DE"/>
           </a:p>
@@ -2069,7 +2069,7 @@
           <a:p>
             <a:fld id="{CD874F49-FEBB-FF42-B278-30C4F47372F7}" type="datetimeFigureOut">
               <a:rPr lang="de-DE" smtClean="0"/>
-              <a:t>08.07.25</a:t>
+              <a:t>15.07.25</a:t>
             </a:fld>
             <a:endParaRPr lang="de-DE"/>
           </a:p>
@@ -2380,7 +2380,7 @@
           <a:p>
             <a:fld id="{CD874F49-FEBB-FF42-B278-30C4F47372F7}" type="datetimeFigureOut">
               <a:rPr lang="de-DE" smtClean="0"/>
-              <a:t>08.07.25</a:t>
+              <a:t>15.07.25</a:t>
             </a:fld>
             <a:endParaRPr lang="de-DE"/>
           </a:p>
@@ -2668,7 +2668,7 @@
           <a:p>
             <a:fld id="{CD874F49-FEBB-FF42-B278-30C4F47372F7}" type="datetimeFigureOut">
               <a:rPr lang="de-DE" smtClean="0"/>
-              <a:t>08.07.25</a:t>
+              <a:t>15.07.25</a:t>
             </a:fld>
             <a:endParaRPr lang="de-DE"/>
           </a:p>
@@ -2909,7 +2909,7 @@
           <a:p>
             <a:fld id="{CD874F49-FEBB-FF42-B278-30C4F47372F7}" type="datetimeFigureOut">
               <a:rPr lang="de-DE" smtClean="0"/>
-              <a:t>08.07.25</a:t>
+              <a:t>15.07.25</a:t>
             </a:fld>
             <a:endParaRPr lang="de-DE"/>
           </a:p>
@@ -3348,7 +3348,7 @@
         <p:spPr>
           <a:xfrm>
             <a:off x="697523" y="712177"/>
-            <a:ext cx="5641729" cy="4231297"/>
+            <a:ext cx="5641729" cy="4231296"/>
           </a:xfrm>
           <a:prstGeom prst="rect">
             <a:avLst/>
@@ -3398,49 +3398,6 @@
           </a:fontRef>
         </p:style>
       </p:cxnSp>
-      <p:cxnSp>
-        <p:nvCxnSpPr>
-          <p:cNvPr id="8" name="Gerade Verbindung 7">
-            <a:extLst>
-              <a:ext uri="{FF2B5EF4-FFF2-40B4-BE49-F238E27FC236}">
-                <a16:creationId xmlns:a16="http://schemas.microsoft.com/office/drawing/2014/main" id="{5402ECB5-D47D-AC0A-9DDC-5800841F17EE}"/>
-              </a:ext>
-            </a:extLst>
-          </p:cNvPr>
-          <p:cNvCxnSpPr>
-            <a:cxnSpLocks/>
-          </p:cNvCxnSpPr>
-          <p:nvPr/>
-        </p:nvCxnSpPr>
-        <p:spPr>
-          <a:xfrm flipH="1" flipV="1">
-            <a:off x="3168502" y="2055628"/>
-            <a:ext cx="545804" cy="88474"/>
-          </a:xfrm>
-          <a:prstGeom prst="line">
-            <a:avLst/>
-          </a:prstGeom>
-          <a:ln w="9525">
-            <a:solidFill>
-              <a:srgbClr val="BBBBBB"/>
-            </a:solidFill>
-          </a:ln>
-        </p:spPr>
-        <p:style>
-          <a:lnRef idx="1">
-            <a:schemeClr val="accent1"/>
-          </a:lnRef>
-          <a:fillRef idx="0">
-            <a:schemeClr val="accent1"/>
-          </a:fillRef>
-          <a:effectRef idx="0">
-            <a:schemeClr val="accent1"/>
-          </a:effectRef>
-          <a:fontRef idx="minor">
-            <a:schemeClr val="tx1"/>
-          </a:fontRef>
-        </p:style>
-      </p:cxnSp>
       <p:sp>
         <p:nvSpPr>
           <p:cNvPr id="23" name="Textfeld 22">
@@ -3472,7 +3429,7 @@
             <a:r>
               <a:rPr lang="de-DE" sz="1400" dirty="0">
                 <a:solidFill>
-                  <a:srgbClr val="0072B2"/>
+                  <a:srgbClr val="D36321"/>
                 </a:solidFill>
                 <a:latin typeface="Helvetica" pitchFamily="2" charset="0"/>
                 <a:cs typeface="Consolas" panose="020B0609020204030204" pitchFamily="49" charset="0"/>
@@ -3482,7 +3439,7 @@
             <a:r>
               <a:rPr lang="de-DE" sz="1400" dirty="0" err="1">
                 <a:solidFill>
-                  <a:srgbClr val="0072B2"/>
+                  <a:srgbClr val="D36321"/>
                 </a:solidFill>
                 <a:latin typeface="Helvetica" pitchFamily="2" charset="0"/>
                 <a:cs typeface="Consolas" panose="020B0609020204030204" pitchFamily="49" charset="0"/>
@@ -3492,7 +3449,7 @@
             <a:r>
               <a:rPr lang="de-DE" sz="1400" dirty="0">
                 <a:solidFill>
-                  <a:srgbClr val="0072B2"/>
+                  <a:srgbClr val="D36321"/>
                 </a:solidFill>
                 <a:latin typeface="Helvetica" pitchFamily="2" charset="0"/>
                 <a:cs typeface="Consolas" panose="020B0609020204030204" pitchFamily="49" charset="0"/>
@@ -3502,7 +3459,7 @@
             <a:r>
               <a:rPr lang="de-DE" sz="1400" dirty="0" err="1">
                 <a:solidFill>
-                  <a:srgbClr val="0072B2"/>
+                  <a:srgbClr val="D36321"/>
                 </a:solidFill>
                 <a:latin typeface="Helvetica" pitchFamily="2" charset="0"/>
                 <a:cs typeface="Consolas" panose="020B0609020204030204" pitchFamily="49" charset="0"/>
@@ -3511,7 +3468,7 @@
             </a:r>
             <a:endParaRPr lang="de-DE" sz="1400" dirty="0">
               <a:solidFill>
-                <a:srgbClr val="0072B2"/>
+                <a:srgbClr val="D36321"/>
               </a:solidFill>
               <a:latin typeface="Helvetica" pitchFamily="2" charset="0"/>
               <a:cs typeface="Consolas" panose="020B0609020204030204" pitchFamily="49" charset="0"/>
@@ -3631,7 +3588,7 @@
             <a:r>
               <a:rPr lang="de-DE" sz="1400" dirty="0">
                 <a:solidFill>
-                  <a:srgbClr val="D8CD39"/>
+                  <a:srgbClr val="E69F00"/>
                 </a:solidFill>
                 <a:latin typeface="Helvetica" pitchFamily="2" charset="0"/>
                 <a:cs typeface="Consolas" panose="020B0609020204030204" pitchFamily="49" charset="0"/>
@@ -3641,7 +3598,7 @@
             <a:r>
               <a:rPr lang="de-DE" sz="1400" dirty="0" err="1">
                 <a:solidFill>
-                  <a:srgbClr val="D8CD39"/>
+                  <a:srgbClr val="E69F00"/>
                 </a:solidFill>
                 <a:latin typeface="Helvetica" pitchFamily="2" charset="0"/>
                 <a:cs typeface="Consolas" panose="020B0609020204030204" pitchFamily="49" charset="0"/>
@@ -3651,7 +3608,7 @@
             <a:r>
               <a:rPr lang="de-DE" sz="1400" dirty="0">
                 <a:solidFill>
-                  <a:srgbClr val="D8CD39"/>
+                  <a:srgbClr val="E69F00"/>
                 </a:solidFill>
                 <a:latin typeface="Helvetica" pitchFamily="2" charset="0"/>
                 <a:cs typeface="Consolas" panose="020B0609020204030204" pitchFamily="49" charset="0"/>
@@ -3661,7 +3618,7 @@
             <a:r>
               <a:rPr lang="de-DE" sz="1400" dirty="0" err="1">
                 <a:solidFill>
-                  <a:srgbClr val="D8CD39"/>
+                  <a:srgbClr val="E69F00"/>
                 </a:solidFill>
                 <a:latin typeface="Helvetica" pitchFamily="2" charset="0"/>
                 <a:cs typeface="Consolas" panose="020B0609020204030204" pitchFamily="49" charset="0"/>
@@ -3671,7 +3628,7 @@
             <a:r>
               <a:rPr lang="de-DE" sz="1400" dirty="0">
                 <a:solidFill>
-                  <a:srgbClr val="D8CD39"/>
+                  <a:srgbClr val="E69F00"/>
                 </a:solidFill>
                 <a:latin typeface="Helvetica" pitchFamily="2" charset="0"/>
                 <a:cs typeface="Consolas" panose="020B0609020204030204" pitchFamily="49" charset="0"/>
@@ -3681,7 +3638,7 @@
             <a:r>
               <a:rPr lang="de-DE" sz="1400" dirty="0" err="1">
                 <a:solidFill>
-                  <a:srgbClr val="D8CD39"/>
+                  <a:srgbClr val="E69F00"/>
                 </a:solidFill>
                 <a:latin typeface="Helvetica" pitchFamily="2" charset="0"/>
                 <a:cs typeface="Consolas" panose="020B0609020204030204" pitchFamily="49" charset="0"/>
@@ -3690,7 +3647,7 @@
             </a:r>
             <a:endParaRPr lang="de-DE" sz="1400" dirty="0">
               <a:solidFill>
-                <a:srgbClr val="D8CD39"/>
+                <a:srgbClr val="E69F00"/>
               </a:solidFill>
               <a:latin typeface="Helvetica" pitchFamily="2" charset="0"/>
               <a:cs typeface="Consolas" panose="020B0609020204030204" pitchFamily="49" charset="0"/>
@@ -3883,7 +3840,7 @@
             <a:r>
               <a:rPr lang="de-DE" sz="1400" dirty="0">
                 <a:solidFill>
-                  <a:srgbClr val="009E73"/>
+                  <a:srgbClr val="CC79A7"/>
                 </a:solidFill>
                 <a:latin typeface="Helvetica" pitchFamily="2" charset="0"/>
                 <a:cs typeface="Consolas" panose="020B0609020204030204" pitchFamily="49" charset="0"/>
@@ -3893,7 +3850,7 @@
             <a:r>
               <a:rPr lang="de-DE" sz="1400" dirty="0" err="1">
                 <a:solidFill>
-                  <a:srgbClr val="009E73"/>
+                  <a:srgbClr val="CC79A7"/>
                 </a:solidFill>
                 <a:latin typeface="Helvetica" pitchFamily="2" charset="0"/>
                 <a:cs typeface="Consolas" panose="020B0609020204030204" pitchFamily="49" charset="0"/>
@@ -3902,7 +3859,7 @@
             </a:r>
             <a:endParaRPr lang="de-DE" sz="1400" dirty="0">
               <a:solidFill>
-                <a:srgbClr val="009E73"/>
+                <a:srgbClr val="CC79A7"/>
               </a:solidFill>
               <a:latin typeface="Helvetica" pitchFamily="2" charset="0"/>
               <a:cs typeface="Consolas" panose="020B0609020204030204" pitchFamily="49" charset="0"/>

</xml_diff>

<commit_message>
Added some robustness checks to example 2 (still need to be visualized)
</commit_message>
<xml_diff>
--- a/plots/age.pptx
+++ b/plots/age.pptx
@@ -259,7 +259,7 @@
           <a:p>
             <a:fld id="{CD874F49-FEBB-FF42-B278-30C4F47372F7}" type="datetimeFigureOut">
               <a:rPr lang="de-DE" smtClean="0"/>
-              <a:t>15.07.25</a:t>
+              <a:t>16.07.25</a:t>
             </a:fld>
             <a:endParaRPr lang="de-DE"/>
           </a:p>
@@ -457,7 +457,7 @@
           <a:p>
             <a:fld id="{CD874F49-FEBB-FF42-B278-30C4F47372F7}" type="datetimeFigureOut">
               <a:rPr lang="de-DE" smtClean="0"/>
-              <a:t>15.07.25</a:t>
+              <a:t>16.07.25</a:t>
             </a:fld>
             <a:endParaRPr lang="de-DE"/>
           </a:p>
@@ -665,7 +665,7 @@
           <a:p>
             <a:fld id="{CD874F49-FEBB-FF42-B278-30C4F47372F7}" type="datetimeFigureOut">
               <a:rPr lang="de-DE" smtClean="0"/>
-              <a:t>15.07.25</a:t>
+              <a:t>16.07.25</a:t>
             </a:fld>
             <a:endParaRPr lang="de-DE"/>
           </a:p>
@@ -863,7 +863,7 @@
           <a:p>
             <a:fld id="{CD874F49-FEBB-FF42-B278-30C4F47372F7}" type="datetimeFigureOut">
               <a:rPr lang="de-DE" smtClean="0"/>
-              <a:t>15.07.25</a:t>
+              <a:t>16.07.25</a:t>
             </a:fld>
             <a:endParaRPr lang="de-DE"/>
           </a:p>
@@ -1138,7 +1138,7 @@
           <a:p>
             <a:fld id="{CD874F49-FEBB-FF42-B278-30C4F47372F7}" type="datetimeFigureOut">
               <a:rPr lang="de-DE" smtClean="0"/>
-              <a:t>15.07.25</a:t>
+              <a:t>16.07.25</a:t>
             </a:fld>
             <a:endParaRPr lang="de-DE"/>
           </a:p>
@@ -1403,7 +1403,7 @@
           <a:p>
             <a:fld id="{CD874F49-FEBB-FF42-B278-30C4F47372F7}" type="datetimeFigureOut">
               <a:rPr lang="de-DE" smtClean="0"/>
-              <a:t>15.07.25</a:t>
+              <a:t>16.07.25</a:t>
             </a:fld>
             <a:endParaRPr lang="de-DE"/>
           </a:p>
@@ -1815,7 +1815,7 @@
           <a:p>
             <a:fld id="{CD874F49-FEBB-FF42-B278-30C4F47372F7}" type="datetimeFigureOut">
               <a:rPr lang="de-DE" smtClean="0"/>
-              <a:t>15.07.25</a:t>
+              <a:t>16.07.25</a:t>
             </a:fld>
             <a:endParaRPr lang="de-DE"/>
           </a:p>
@@ -1956,7 +1956,7 @@
           <a:p>
             <a:fld id="{CD874F49-FEBB-FF42-B278-30C4F47372F7}" type="datetimeFigureOut">
               <a:rPr lang="de-DE" smtClean="0"/>
-              <a:t>15.07.25</a:t>
+              <a:t>16.07.25</a:t>
             </a:fld>
             <a:endParaRPr lang="de-DE"/>
           </a:p>
@@ -2069,7 +2069,7 @@
           <a:p>
             <a:fld id="{CD874F49-FEBB-FF42-B278-30C4F47372F7}" type="datetimeFigureOut">
               <a:rPr lang="de-DE" smtClean="0"/>
-              <a:t>15.07.25</a:t>
+              <a:t>16.07.25</a:t>
             </a:fld>
             <a:endParaRPr lang="de-DE"/>
           </a:p>
@@ -2380,7 +2380,7 @@
           <a:p>
             <a:fld id="{CD874F49-FEBB-FF42-B278-30C4F47372F7}" type="datetimeFigureOut">
               <a:rPr lang="de-DE" smtClean="0"/>
-              <a:t>15.07.25</a:t>
+              <a:t>16.07.25</a:t>
             </a:fld>
             <a:endParaRPr lang="de-DE"/>
           </a:p>
@@ -2668,7 +2668,7 @@
           <a:p>
             <a:fld id="{CD874F49-FEBB-FF42-B278-30C4F47372F7}" type="datetimeFigureOut">
               <a:rPr lang="de-DE" smtClean="0"/>
-              <a:t>15.07.25</a:t>
+              <a:t>16.07.25</a:t>
             </a:fld>
             <a:endParaRPr lang="de-DE"/>
           </a:p>
@@ -2909,7 +2909,7 @@
           <a:p>
             <a:fld id="{CD874F49-FEBB-FF42-B278-30C4F47372F7}" type="datetimeFigureOut">
               <a:rPr lang="de-DE" smtClean="0"/>
-              <a:t>15.07.25</a:t>
+              <a:t>16.07.25</a:t>
             </a:fld>
             <a:endParaRPr lang="de-DE"/>
           </a:p>
@@ -3348,7 +3348,7 @@
         <p:spPr>
           <a:xfrm>
             <a:off x="697523" y="712177"/>
-            <a:ext cx="5641729" cy="4231296"/>
+            <a:ext cx="5641728" cy="4231296"/>
           </a:xfrm>
           <a:prstGeom prst="rect">
             <a:avLst/>

</xml_diff>